<commit_message>
update bootstrap ci fig
</commit_message>
<xml_diff>
--- a/figures/manuscript_versions/final_figures.pptx
+++ b/figures/manuscript_versions/final_figures.pptx
@@ -7122,8 +7122,8 @@
                     </a:prstGeom>
                   </p:spPr>
                 </p:pic>
-                <mc:AlternateContent xmlns:mc="http://schemas.openxmlformats.org/markup-compatibility/2006">
-                  <mc:Choice xmlns:a14="http://schemas.microsoft.com/office/drawing/2010/main" Requires="a14">
+                <mc:AlternateContent xmlns:mc="http://schemas.openxmlformats.org/markup-compatibility/2006" xmlns:a14="http://schemas.microsoft.com/office/drawing/2010/main">
+                  <mc:Choice Requires="a14">
                     <p:sp>
                       <p:nvSpPr>
                         <p:cNvPr id="7" name="TextBox 6">
@@ -7207,7 +7207,7 @@
                       </p:txBody>
                     </p:sp>
                   </mc:Choice>
-                  <mc:Fallback>
+                  <mc:Fallback xmlns="">
                     <p:sp>
                       <p:nvSpPr>
                         <p:cNvPr id="7" name="TextBox 6">
@@ -7257,8 +7257,8 @@
                     </p:sp>
                   </mc:Fallback>
                 </mc:AlternateContent>
-                <mc:AlternateContent xmlns:mc="http://schemas.openxmlformats.org/markup-compatibility/2006">
-                  <mc:Choice xmlns:a14="http://schemas.microsoft.com/office/drawing/2010/main" Requires="a14">
+                <mc:AlternateContent xmlns:mc="http://schemas.openxmlformats.org/markup-compatibility/2006" xmlns:a14="http://schemas.microsoft.com/office/drawing/2010/main">
+                  <mc:Choice Requires="a14">
                     <p:sp>
                       <p:nvSpPr>
                         <p:cNvPr id="8" name="TextBox 7">
@@ -7342,7 +7342,7 @@
                       </p:txBody>
                     </p:sp>
                   </mc:Choice>
-                  <mc:Fallback>
+                  <mc:Fallback xmlns="">
                     <p:sp>
                       <p:nvSpPr>
                         <p:cNvPr id="8" name="TextBox 7">
@@ -7392,8 +7392,8 @@
                     </p:sp>
                   </mc:Fallback>
                 </mc:AlternateContent>
-                <mc:AlternateContent xmlns:mc="http://schemas.openxmlformats.org/markup-compatibility/2006">
-                  <mc:Choice xmlns:a14="http://schemas.microsoft.com/office/drawing/2010/main" Requires="a14">
+                <mc:AlternateContent xmlns:mc="http://schemas.openxmlformats.org/markup-compatibility/2006" xmlns:a14="http://schemas.microsoft.com/office/drawing/2010/main">
+                  <mc:Choice Requires="a14">
                     <p:sp>
                       <p:nvSpPr>
                         <p:cNvPr id="9" name="TextBox 8">
@@ -7456,7 +7456,7 @@
                       </p:txBody>
                     </p:sp>
                   </mc:Choice>
-                  <mc:Fallback>
+                  <mc:Fallback xmlns="">
                     <p:sp>
                       <p:nvSpPr>
                         <p:cNvPr id="9" name="TextBox 8">
@@ -7506,8 +7506,8 @@
                     </p:sp>
                   </mc:Fallback>
                 </mc:AlternateContent>
-                <mc:AlternateContent xmlns:mc="http://schemas.openxmlformats.org/markup-compatibility/2006">
-                  <mc:Choice xmlns:a14="http://schemas.microsoft.com/office/drawing/2010/main" Requires="a14">
+                <mc:AlternateContent xmlns:mc="http://schemas.openxmlformats.org/markup-compatibility/2006" xmlns:a14="http://schemas.microsoft.com/office/drawing/2010/main">
+                  <mc:Choice Requires="a14">
                     <p:sp>
                       <p:nvSpPr>
                         <p:cNvPr id="10" name="TextBox 9">
@@ -7570,7 +7570,7 @@
                       </p:txBody>
                     </p:sp>
                   </mc:Choice>
-                  <mc:Fallback>
+                  <mc:Fallback xmlns="">
                     <p:sp>
                       <p:nvSpPr>
                         <p:cNvPr id="10" name="TextBox 9">
@@ -8543,9 +8543,9 @@
         <p:grpSpPr>
           <a:xfrm>
             <a:off x="1505473" y="424466"/>
-            <a:ext cx="9194734" cy="6082157"/>
+            <a:ext cx="9219785" cy="6082157"/>
             <a:chOff x="1505473" y="424466"/>
-            <a:chExt cx="9194734" cy="6082157"/>
+            <a:chExt cx="9219785" cy="6082157"/>
           </a:xfrm>
         </p:grpSpPr>
         <p:grpSp>
@@ -8563,9 +8563,9 @@
           <p:grpSpPr>
             <a:xfrm>
               <a:off x="1505473" y="424466"/>
-              <a:ext cx="9194734" cy="6082157"/>
+              <a:ext cx="9219785" cy="6082157"/>
               <a:chOff x="115539" y="403310"/>
-              <a:chExt cx="9194734" cy="6082157"/>
+              <a:chExt cx="9219785" cy="6082157"/>
             </a:xfrm>
           </p:grpSpPr>
           <p:grpSp>
@@ -8583,9 +8583,9 @@
             <p:grpSpPr>
               <a:xfrm>
                 <a:off x="115539" y="403310"/>
-                <a:ext cx="9194734" cy="6051379"/>
+                <a:ext cx="9219785" cy="6051379"/>
                 <a:chOff x="115539" y="403310"/>
-                <a:chExt cx="9194734" cy="6051379"/>
+                <a:chExt cx="9219785" cy="6051379"/>
               </a:xfrm>
             </p:grpSpPr>
             <p:grpSp>
@@ -8603,9 +8603,9 @@
               <p:grpSpPr>
                 <a:xfrm>
                   <a:off x="115539" y="403310"/>
-                  <a:ext cx="9194734" cy="6051379"/>
+                  <a:ext cx="9219785" cy="6051379"/>
                   <a:chOff x="73497" y="403310"/>
-                  <a:chExt cx="9194734" cy="6051379"/>
+                  <a:chExt cx="9219785" cy="6051379"/>
                 </a:xfrm>
               </p:grpSpPr>
               <p:grpSp>
@@ -8623,9 +8623,9 @@
                 <p:grpSpPr>
                   <a:xfrm>
                     <a:off x="73497" y="403310"/>
-                    <a:ext cx="9194734" cy="6051379"/>
+                    <a:ext cx="9219785" cy="6051379"/>
                     <a:chOff x="-122520" y="-228600"/>
-                    <a:chExt cx="10615503" cy="6986436"/>
+                    <a:chExt cx="10644426" cy="6986436"/>
                   </a:xfrm>
                 </p:grpSpPr>
                 <p:pic>
@@ -8644,12 +8644,12 @@
                   </p:nvPicPr>
                   <p:blipFill>
                     <a:blip r:embed="rId2"/>
-                    <a:srcRect l="14219" r="8121"/>
+                    <a:srcRect l="14107" r="8233"/>
                     <a:stretch/>
                   </p:blipFill>
                   <p:spPr>
                     <a:xfrm>
-                      <a:off x="5522066" y="-228600"/>
+                      <a:off x="5550989" y="-228600"/>
                       <a:ext cx="4970917" cy="3657600"/>
                     </a:xfrm>
                     <a:prstGeom prst="rect">
@@ -8673,13 +8673,13 @@
                   </p:nvPicPr>
                   <p:blipFill>
                     <a:blip r:embed="rId3"/>
-                    <a:srcRect l="12326" r="7627"/>
+                    <a:srcRect l="12278" r="8031"/>
                     <a:stretch/>
                   </p:blipFill>
                   <p:spPr>
                     <a:xfrm>
-                      <a:off x="5328095" y="3100236"/>
-                      <a:ext cx="5123605" cy="3657600"/>
+                      <a:off x="5388638" y="3100236"/>
+                      <a:ext cx="5100906" cy="3657600"/>
                     </a:xfrm>
                     <a:prstGeom prst="rect">
                       <a:avLst/>

</xml_diff>